<commit_message>
files changes for MITP linewidth/textsize reqs
some of the lines were to narrow and some text too small
some files changed to pptx, so if two files have same name, the one with pptx is the latest
</commit_message>
<xml_diff>
--- a/Sources/half-adder.pptx
+++ b/Sources/half-adder.pptx
@@ -263,7 +263,7 @@
           <a:p>
             <a:fld id="{E240DB20-3BE9-475C-AA31-1B930CA54021}" type="datetimeFigureOut">
               <a:rPr lang="en-US" smtClean="0"/>
-              <a:t>10/31/2017</a:t>
+              <a:t>2/2/2018</a:t>
             </a:fld>
             <a:endParaRPr lang="en-US"/>
           </a:p>
@@ -461,7 +461,7 @@
           <a:p>
             <a:fld id="{E240DB20-3BE9-475C-AA31-1B930CA54021}" type="datetimeFigureOut">
               <a:rPr lang="en-US" smtClean="0"/>
-              <a:t>10/31/2017</a:t>
+              <a:t>2/2/2018</a:t>
             </a:fld>
             <a:endParaRPr lang="en-US"/>
           </a:p>
@@ -669,7 +669,7 @@
           <a:p>
             <a:fld id="{E240DB20-3BE9-475C-AA31-1B930CA54021}" type="datetimeFigureOut">
               <a:rPr lang="en-US" smtClean="0"/>
-              <a:t>10/31/2017</a:t>
+              <a:t>2/2/2018</a:t>
             </a:fld>
             <a:endParaRPr lang="en-US"/>
           </a:p>
@@ -867,7 +867,7 @@
           <a:p>
             <a:fld id="{E240DB20-3BE9-475C-AA31-1B930CA54021}" type="datetimeFigureOut">
               <a:rPr lang="en-US" smtClean="0"/>
-              <a:t>10/31/2017</a:t>
+              <a:t>2/2/2018</a:t>
             </a:fld>
             <a:endParaRPr lang="en-US"/>
           </a:p>
@@ -1142,7 +1142,7 @@
           <a:p>
             <a:fld id="{E240DB20-3BE9-475C-AA31-1B930CA54021}" type="datetimeFigureOut">
               <a:rPr lang="en-US" smtClean="0"/>
-              <a:t>10/31/2017</a:t>
+              <a:t>2/2/2018</a:t>
             </a:fld>
             <a:endParaRPr lang="en-US"/>
           </a:p>
@@ -1407,7 +1407,7 @@
           <a:p>
             <a:fld id="{E240DB20-3BE9-475C-AA31-1B930CA54021}" type="datetimeFigureOut">
               <a:rPr lang="en-US" smtClean="0"/>
-              <a:t>10/31/2017</a:t>
+              <a:t>2/2/2018</a:t>
             </a:fld>
             <a:endParaRPr lang="en-US"/>
           </a:p>
@@ -1819,7 +1819,7 @@
           <a:p>
             <a:fld id="{E240DB20-3BE9-475C-AA31-1B930CA54021}" type="datetimeFigureOut">
               <a:rPr lang="en-US" smtClean="0"/>
-              <a:t>10/31/2017</a:t>
+              <a:t>2/2/2018</a:t>
             </a:fld>
             <a:endParaRPr lang="en-US"/>
           </a:p>
@@ -1960,7 +1960,7 @@
           <a:p>
             <a:fld id="{E240DB20-3BE9-475C-AA31-1B930CA54021}" type="datetimeFigureOut">
               <a:rPr lang="en-US" smtClean="0"/>
-              <a:t>10/31/2017</a:t>
+              <a:t>2/2/2018</a:t>
             </a:fld>
             <a:endParaRPr lang="en-US"/>
           </a:p>
@@ -2073,7 +2073,7 @@
           <a:p>
             <a:fld id="{E240DB20-3BE9-475C-AA31-1B930CA54021}" type="datetimeFigureOut">
               <a:rPr lang="en-US" smtClean="0"/>
-              <a:t>10/31/2017</a:t>
+              <a:t>2/2/2018</a:t>
             </a:fld>
             <a:endParaRPr lang="en-US"/>
           </a:p>
@@ -2384,7 +2384,7 @@
           <a:p>
             <a:fld id="{E240DB20-3BE9-475C-AA31-1B930CA54021}" type="datetimeFigureOut">
               <a:rPr lang="en-US" smtClean="0"/>
-              <a:t>10/31/2017</a:t>
+              <a:t>2/2/2018</a:t>
             </a:fld>
             <a:endParaRPr lang="en-US"/>
           </a:p>
@@ -2672,7 +2672,7 @@
           <a:p>
             <a:fld id="{E240DB20-3BE9-475C-AA31-1B930CA54021}" type="datetimeFigureOut">
               <a:rPr lang="en-US" smtClean="0"/>
-              <a:t>10/31/2017</a:t>
+              <a:t>2/2/2018</a:t>
             </a:fld>
             <a:endParaRPr lang="en-US"/>
           </a:p>
@@ -2913,7 +2913,7 @@
           <a:p>
             <a:fld id="{E240DB20-3BE9-475C-AA31-1B930CA54021}" type="datetimeFigureOut">
               <a:rPr lang="en-US" smtClean="0"/>
-              <a:t>10/31/2017</a:t>
+              <a:t>2/2/2018</a:t>
             </a:fld>
             <a:endParaRPr lang="en-US"/>
           </a:p>
@@ -3332,582 +3332,6 @@
       </p:grpSpPr>
       <p:graphicFrame>
         <p:nvGraphicFramePr>
-          <p:cNvPr id="9" name="Object 72">
-            <a:extLst>
-              <a:ext uri="{FF2B5EF4-FFF2-40B4-BE49-F238E27FC236}">
-                <a16:creationId xmlns:a16="http://schemas.microsoft.com/office/drawing/2014/main" id="{05371331-D12F-4DA5-847E-27AB60140B00}"/>
-              </a:ext>
-            </a:extLst>
-          </p:cNvPr>
-          <p:cNvGraphicFramePr>
-            <a:graphicFrameLocks noChangeAspect="1"/>
-          </p:cNvGraphicFramePr>
-          <p:nvPr>
-            <p:extLst>
-              <p:ext uri="{D42A27DB-BD31-4B8C-83A1-F6EECF244321}">
-                <p14:modId xmlns:p14="http://schemas.microsoft.com/office/powerpoint/2010/main" val="3818471787"/>
-              </p:ext>
-            </p:extLst>
-          </p:nvPr>
-        </p:nvGraphicFramePr>
-        <p:xfrm>
-          <a:off x="2217500" y="1318188"/>
-          <a:ext cx="1293813" cy="879475"/>
-        </p:xfrm>
-        <a:graphic>
-          <a:graphicData uri="http://schemas.openxmlformats.org/presentationml/2006/ole">
-            <mc:AlternateContent xmlns:mc="http://schemas.openxmlformats.org/markup-compatibility/2006">
-              <mc:Choice xmlns:v="urn:schemas-microsoft-com:vml" Requires="v">
-                <p:oleObj spid="_x0000_s1046" name="Visio" r:id="rId3" imgW="1294089" imgH="880700" progId="Visio.Drawing.6">
-                  <p:embed/>
-                </p:oleObj>
-              </mc:Choice>
-              <mc:Fallback>
-                <p:oleObj name="Visio" r:id="rId3" imgW="1294089" imgH="880700" progId="Visio.Drawing.6">
-                  <p:embed/>
-                  <p:pic>
-                    <p:nvPicPr>
-                      <p:cNvPr id="4184" name="Object 72">
-                        <a:extLst>
-                          <a:ext uri="{FF2B5EF4-FFF2-40B4-BE49-F238E27FC236}">
-                            <a16:creationId xmlns:a16="http://schemas.microsoft.com/office/drawing/2014/main" id="{2A823A69-44B7-4DCF-83A3-F7A121EA35CD}"/>
-                          </a:ext>
-                        </a:extLst>
-                      </p:cNvPr>
-                      <p:cNvPicPr>
-                        <a:picLocks noChangeAspect="1" noChangeArrowheads="1"/>
-                      </p:cNvPicPr>
-                      <p:nvPr/>
-                    </p:nvPicPr>
-                    <p:blipFill>
-                      <a:blip r:embed="rId4">
-                        <a:extLst>
-                          <a:ext uri="{28A0092B-C50C-407E-A947-70E740481C1C}">
-                            <a14:useLocalDpi xmlns:a14="http://schemas.microsoft.com/office/drawing/2010/main" val="0"/>
-                          </a:ext>
-                        </a:extLst>
-                      </a:blip>
-                      <a:srcRect/>
-                      <a:stretch>
-                        <a:fillRect/>
-                      </a:stretch>
-                    </p:blipFill>
-                    <p:spPr bwMode="auto">
-                      <a:xfrm>
-                        <a:off x="2217500" y="1318188"/>
-                        <a:ext cx="1293813" cy="879475"/>
-                      </a:xfrm>
-                      <a:prstGeom prst="rect">
-                        <a:avLst/>
-                      </a:prstGeom>
-                      <a:noFill/>
-                      <a:ln>
-                        <a:noFill/>
-                      </a:ln>
-                      <a:effectLst/>
-                      <a:extLst>
-                        <a:ext uri="{909E8E84-426E-40DD-AFC4-6F175D3DCCD1}">
-                          <a14:hiddenFill xmlns:a14="http://schemas.microsoft.com/office/drawing/2010/main">
-                            <a:solidFill>
-                              <a:schemeClr val="accent1"/>
-                            </a:solidFill>
-                          </a14:hiddenFill>
-                        </a:ext>
-                        <a:ext uri="{91240B29-F687-4F45-9708-019B960494DF}">
-                          <a14:hiddenLine xmlns:a14="http://schemas.microsoft.com/office/drawing/2010/main" w="9525">
-                            <a:solidFill>
-                              <a:schemeClr val="tx1"/>
-                            </a:solidFill>
-                            <a:miter lim="800000"/>
-                            <a:headEnd/>
-                            <a:tailEnd/>
-                          </a14:hiddenLine>
-                        </a:ext>
-                        <a:ext uri="{AF507438-7753-43E0-B8FC-AC1667EBCBE1}">
-                          <a14:hiddenEffects xmlns:a14="http://schemas.microsoft.com/office/drawing/2010/main">
-                            <a:effectLst>
-                              <a:outerShdw dist="35921" dir="2700000" algn="ctr" rotWithShape="0">
-                                <a:schemeClr val="bg2"/>
-                              </a:outerShdw>
-                            </a:effectLst>
-                          </a14:hiddenEffects>
-                        </a:ext>
-                      </a:extLst>
-                    </p:spPr>
-                  </p:pic>
-                </p:oleObj>
-              </mc:Fallback>
-            </mc:AlternateContent>
-          </a:graphicData>
-        </a:graphic>
-      </p:graphicFrame>
-      <p:graphicFrame>
-        <p:nvGraphicFramePr>
-          <p:cNvPr id="18" name="Object 27">
-            <a:extLst>
-              <a:ext uri="{FF2B5EF4-FFF2-40B4-BE49-F238E27FC236}">
-                <a16:creationId xmlns:a16="http://schemas.microsoft.com/office/drawing/2014/main" id="{45F3E139-CB09-414F-AAC4-CFA669E55933}"/>
-              </a:ext>
-            </a:extLst>
-          </p:cNvPr>
-          <p:cNvGraphicFramePr>
-            <a:graphicFrameLocks noChangeAspect="1"/>
-          </p:cNvGraphicFramePr>
-          <p:nvPr>
-            <p:extLst>
-              <p:ext uri="{D42A27DB-BD31-4B8C-83A1-F6EECF244321}">
-                <p14:modId xmlns:p14="http://schemas.microsoft.com/office/powerpoint/2010/main" val="1037452861"/>
-              </p:ext>
-            </p:extLst>
-          </p:nvPr>
-        </p:nvGraphicFramePr>
-        <p:xfrm>
-          <a:off x="2184163" y="2448689"/>
-          <a:ext cx="1327150" cy="679435"/>
-        </p:xfrm>
-        <a:graphic>
-          <a:graphicData uri="http://schemas.openxmlformats.org/presentationml/2006/ole">
-            <mc:AlternateContent xmlns:mc="http://schemas.openxmlformats.org/markup-compatibility/2006">
-              <mc:Choice xmlns:v="urn:schemas-microsoft-com:vml" Requires="v">
-                <p:oleObj spid="_x0000_s1047" name="Visio" r:id="rId5" imgW="1326666" imgH="679622" progId="Visio.Drawing.6">
-                  <p:embed/>
-                </p:oleObj>
-              </mc:Choice>
-              <mc:Fallback>
-                <p:oleObj name="Visio" r:id="rId5" imgW="1326666" imgH="679622" progId="Visio.Drawing.6">
-                  <p:embed/>
-                  <p:pic>
-                    <p:nvPicPr>
-                      <p:cNvPr id="4146" name="Object 27">
-                        <a:extLst>
-                          <a:ext uri="{FF2B5EF4-FFF2-40B4-BE49-F238E27FC236}">
-                            <a16:creationId xmlns:a16="http://schemas.microsoft.com/office/drawing/2014/main" id="{8DA47825-00D8-4CE6-B16E-0DB9AC414622}"/>
-                          </a:ext>
-                        </a:extLst>
-                      </p:cNvPr>
-                      <p:cNvPicPr>
-                        <a:picLocks noChangeAspect="1" noChangeArrowheads="1"/>
-                      </p:cNvPicPr>
-                      <p:nvPr/>
-                    </p:nvPicPr>
-                    <p:blipFill>
-                      <a:blip r:embed="rId6">
-                        <a:extLst>
-                          <a:ext uri="{28A0092B-C50C-407E-A947-70E740481C1C}">
-                            <a14:useLocalDpi xmlns:a14="http://schemas.microsoft.com/office/drawing/2010/main" val="0"/>
-                          </a:ext>
-                        </a:extLst>
-                      </a:blip>
-                      <a:srcRect/>
-                      <a:stretch>
-                        <a:fillRect/>
-                      </a:stretch>
-                    </p:blipFill>
-                    <p:spPr bwMode="auto">
-                      <a:xfrm>
-                        <a:off x="2184163" y="2448689"/>
-                        <a:ext cx="1327150" cy="679435"/>
-                      </a:xfrm>
-                      <a:prstGeom prst="rect">
-                        <a:avLst/>
-                      </a:prstGeom>
-                      <a:noFill/>
-                      <a:ln>
-                        <a:noFill/>
-                      </a:ln>
-                      <a:effectLst/>
-                      <a:extLst>
-                        <a:ext uri="{909E8E84-426E-40DD-AFC4-6F175D3DCCD1}">
-                          <a14:hiddenFill xmlns:a14="http://schemas.microsoft.com/office/drawing/2010/main">
-                            <a:solidFill>
-                              <a:schemeClr val="accent1"/>
-                            </a:solidFill>
-                          </a14:hiddenFill>
-                        </a:ext>
-                        <a:ext uri="{91240B29-F687-4F45-9708-019B960494DF}">
-                          <a14:hiddenLine xmlns:a14="http://schemas.microsoft.com/office/drawing/2010/main" w="9525">
-                            <a:solidFill>
-                              <a:schemeClr val="tx1"/>
-                            </a:solidFill>
-                            <a:miter lim="800000"/>
-                            <a:headEnd/>
-                            <a:tailEnd/>
-                          </a14:hiddenLine>
-                        </a:ext>
-                        <a:ext uri="{AF507438-7753-43E0-B8FC-AC1667EBCBE1}">
-                          <a14:hiddenEffects xmlns:a14="http://schemas.microsoft.com/office/drawing/2010/main">
-                            <a:effectLst>
-                              <a:outerShdw dist="35921" dir="2700000" algn="ctr" rotWithShape="0">
-                                <a:schemeClr val="bg2"/>
-                              </a:outerShdw>
-                            </a:effectLst>
-                          </a14:hiddenEffects>
-                        </a:ext>
-                      </a:extLst>
-                    </p:spPr>
-                  </p:pic>
-                </p:oleObj>
-              </mc:Fallback>
-            </mc:AlternateContent>
-          </a:graphicData>
-        </a:graphic>
-      </p:graphicFrame>
-      <p:cxnSp>
-        <p:nvCxnSpPr>
-          <p:cNvPr id="26" name="Straight Connector 25">
-            <a:extLst>
-              <a:ext uri="{FF2B5EF4-FFF2-40B4-BE49-F238E27FC236}">
-                <a16:creationId xmlns:a16="http://schemas.microsoft.com/office/drawing/2014/main" id="{D084ECB5-7A06-42E6-904C-0D4192388A70}"/>
-              </a:ext>
-            </a:extLst>
-          </p:cNvPr>
-          <p:cNvCxnSpPr>
-            <a:cxnSpLocks/>
-          </p:cNvCxnSpPr>
-          <p:nvPr/>
-        </p:nvCxnSpPr>
-        <p:spPr>
-          <a:xfrm flipV="1">
-            <a:off x="1077915" y="2947310"/>
-            <a:ext cx="1155834" cy="9514"/>
-          </a:xfrm>
-          <a:prstGeom prst="line">
-            <a:avLst/>
-          </a:prstGeom>
-          <a:ln w="3175">
-            <a:solidFill>
-              <a:schemeClr val="tx1"/>
-            </a:solidFill>
-          </a:ln>
-        </p:spPr>
-        <p:style>
-          <a:lnRef idx="1">
-            <a:schemeClr val="dk1"/>
-          </a:lnRef>
-          <a:fillRef idx="0">
-            <a:schemeClr val="dk1"/>
-          </a:fillRef>
-          <a:effectRef idx="0">
-            <a:schemeClr val="dk1"/>
-          </a:effectRef>
-          <a:fontRef idx="minor">
-            <a:schemeClr val="tx1"/>
-          </a:fontRef>
-        </p:style>
-      </p:cxnSp>
-      <p:cxnSp>
-        <p:nvCxnSpPr>
-          <p:cNvPr id="31" name="Straight Connector 30">
-            <a:extLst>
-              <a:ext uri="{FF2B5EF4-FFF2-40B4-BE49-F238E27FC236}">
-                <a16:creationId xmlns:a16="http://schemas.microsoft.com/office/drawing/2014/main" id="{17729233-E3AB-4444-B9B8-4A76CE631CAC}"/>
-              </a:ext>
-            </a:extLst>
-          </p:cNvPr>
-          <p:cNvCxnSpPr>
-            <a:cxnSpLocks/>
-          </p:cNvCxnSpPr>
-          <p:nvPr/>
-        </p:nvCxnSpPr>
-        <p:spPr>
-          <a:xfrm>
-            <a:off x="1085535" y="1592582"/>
-            <a:ext cx="1155834" cy="0"/>
-          </a:xfrm>
-          <a:prstGeom prst="line">
-            <a:avLst/>
-          </a:prstGeom>
-          <a:ln w="3175">
-            <a:solidFill>
-              <a:schemeClr val="tx1"/>
-            </a:solidFill>
-          </a:ln>
-        </p:spPr>
-        <p:style>
-          <a:lnRef idx="1">
-            <a:schemeClr val="dk1"/>
-          </a:lnRef>
-          <a:fillRef idx="0">
-            <a:schemeClr val="dk1"/>
-          </a:fillRef>
-          <a:effectRef idx="0">
-            <a:schemeClr val="dk1"/>
-          </a:effectRef>
-          <a:fontRef idx="minor">
-            <a:schemeClr val="tx1"/>
-          </a:fontRef>
-        </p:style>
-      </p:cxnSp>
-      <p:cxnSp>
-        <p:nvCxnSpPr>
-          <p:cNvPr id="35" name="Connector: Elbow 34">
-            <a:extLst>
-              <a:ext uri="{FF2B5EF4-FFF2-40B4-BE49-F238E27FC236}">
-                <a16:creationId xmlns:a16="http://schemas.microsoft.com/office/drawing/2014/main" id="{C84542A5-2A0B-4A7A-B465-2B659D06F818}"/>
-              </a:ext>
-            </a:extLst>
-          </p:cNvPr>
-          <p:cNvCxnSpPr>
-            <a:cxnSpLocks/>
-          </p:cNvCxnSpPr>
-          <p:nvPr/>
-        </p:nvCxnSpPr>
-        <p:spPr>
-          <a:xfrm rot="16200000" flipH="1">
-            <a:off x="1306831" y="1737361"/>
-            <a:ext cx="1036318" cy="746759"/>
-          </a:xfrm>
-          <a:prstGeom prst="bentConnector3">
-            <a:avLst>
-              <a:gd name="adj1" fmla="val 99632"/>
-            </a:avLst>
-          </a:prstGeom>
-          <a:ln w="3175">
-            <a:solidFill>
-              <a:schemeClr val="tx1"/>
-            </a:solidFill>
-          </a:ln>
-        </p:spPr>
-        <p:style>
-          <a:lnRef idx="1">
-            <a:schemeClr val="accent1"/>
-          </a:lnRef>
-          <a:fillRef idx="0">
-            <a:schemeClr val="accent1"/>
-          </a:fillRef>
-          <a:effectRef idx="0">
-            <a:schemeClr val="accent1"/>
-          </a:effectRef>
-          <a:fontRef idx="minor">
-            <a:schemeClr val="tx1"/>
-          </a:fontRef>
-        </p:style>
-      </p:cxnSp>
-      <p:cxnSp>
-        <p:nvCxnSpPr>
-          <p:cNvPr id="42" name="Connector: Elbow 41">
-            <a:extLst>
-              <a:ext uri="{FF2B5EF4-FFF2-40B4-BE49-F238E27FC236}">
-                <a16:creationId xmlns:a16="http://schemas.microsoft.com/office/drawing/2014/main" id="{27F7499E-544F-4EDC-B698-2865BE31F1EB}"/>
-              </a:ext>
-            </a:extLst>
-          </p:cNvPr>
-          <p:cNvCxnSpPr/>
-          <p:nvPr/>
-        </p:nvCxnSpPr>
-        <p:spPr>
-          <a:xfrm rot="5400000" flipH="1" flipV="1">
-            <a:off x="1694674" y="2190898"/>
-            <a:ext cx="1032619" cy="487824"/>
-          </a:xfrm>
-          <a:prstGeom prst="bentConnector3">
-            <a:avLst>
-              <a:gd name="adj1" fmla="val 101331"/>
-            </a:avLst>
-          </a:prstGeom>
-          <a:ln w="3175">
-            <a:solidFill>
-              <a:schemeClr val="tx1"/>
-            </a:solidFill>
-          </a:ln>
-        </p:spPr>
-        <p:style>
-          <a:lnRef idx="1">
-            <a:schemeClr val="accent1"/>
-          </a:lnRef>
-          <a:fillRef idx="0">
-            <a:schemeClr val="accent1"/>
-          </a:fillRef>
-          <a:effectRef idx="0">
-            <a:schemeClr val="accent1"/>
-          </a:effectRef>
-          <a:fontRef idx="minor">
-            <a:schemeClr val="tx1"/>
-          </a:fontRef>
-        </p:style>
-      </p:cxnSp>
-      <p:sp>
-        <p:nvSpPr>
-          <p:cNvPr id="50" name="TextBox 49">
-            <a:extLst>
-              <a:ext uri="{FF2B5EF4-FFF2-40B4-BE49-F238E27FC236}">
-                <a16:creationId xmlns:a16="http://schemas.microsoft.com/office/drawing/2014/main" id="{4D6AE011-D17C-46EB-AF9C-1729C32F7EAA}"/>
-              </a:ext>
-            </a:extLst>
-          </p:cNvPr>
-          <p:cNvSpPr txBox="1"/>
-          <p:nvPr/>
-        </p:nvSpPr>
-        <p:spPr>
-          <a:xfrm>
-            <a:off x="780582" y="1396245"/>
-            <a:ext cx="431145" cy="369332"/>
-          </a:xfrm>
-          <a:prstGeom prst="rect">
-            <a:avLst/>
-          </a:prstGeom>
-          <a:noFill/>
-          <a:ln>
-            <a:noFill/>
-          </a:ln>
-        </p:spPr>
-        <p:txBody>
-          <a:bodyPr wrap="square" rtlCol="0">
-            <a:spAutoFit/>
-          </a:bodyPr>
-          <a:lstStyle/>
-          <a:p>
-            <a:r>
-              <a:rPr lang="en-US">
-                <a:solidFill>
-                  <a:schemeClr val="tx1">
-                    <a:lumMod val="50000"/>
-                    <a:lumOff val="50000"/>
-                  </a:schemeClr>
-                </a:solidFill>
-              </a:rPr>
-              <a:t>x</a:t>
-            </a:r>
-          </a:p>
-        </p:txBody>
-      </p:sp>
-      <p:sp>
-        <p:nvSpPr>
-          <p:cNvPr id="51" name="TextBox 50">
-            <a:extLst>
-              <a:ext uri="{FF2B5EF4-FFF2-40B4-BE49-F238E27FC236}">
-                <a16:creationId xmlns:a16="http://schemas.microsoft.com/office/drawing/2014/main" id="{38BCC1A8-E34B-4222-9EF0-DDCD15984C85}"/>
-              </a:ext>
-            </a:extLst>
-          </p:cNvPr>
-          <p:cNvSpPr txBox="1"/>
-          <p:nvPr/>
-        </p:nvSpPr>
-        <p:spPr>
-          <a:xfrm>
-            <a:off x="3476918" y="2603740"/>
-            <a:ext cx="431145" cy="369332"/>
-          </a:xfrm>
-          <a:prstGeom prst="rect">
-            <a:avLst/>
-          </a:prstGeom>
-          <a:noFill/>
-          <a:ln>
-            <a:noFill/>
-          </a:ln>
-        </p:spPr>
-        <p:txBody>
-          <a:bodyPr wrap="square" rtlCol="0">
-            <a:spAutoFit/>
-          </a:bodyPr>
-          <a:lstStyle/>
-          <a:p>
-            <a:r>
-              <a:rPr lang="en-US">
-                <a:solidFill>
-                  <a:schemeClr val="tx1">
-                    <a:lumMod val="50000"/>
-                    <a:lumOff val="50000"/>
-                  </a:schemeClr>
-                </a:solidFill>
-              </a:rPr>
-              <a:t>s</a:t>
-            </a:r>
-          </a:p>
-        </p:txBody>
-      </p:sp>
-      <p:sp>
-        <p:nvSpPr>
-          <p:cNvPr id="52" name="TextBox 51">
-            <a:extLst>
-              <a:ext uri="{FF2B5EF4-FFF2-40B4-BE49-F238E27FC236}">
-                <a16:creationId xmlns:a16="http://schemas.microsoft.com/office/drawing/2014/main" id="{57EB6943-2179-4CFD-8F7E-25DB73F2FD26}"/>
-              </a:ext>
-            </a:extLst>
-          </p:cNvPr>
-          <p:cNvSpPr txBox="1"/>
-          <p:nvPr/>
-        </p:nvSpPr>
-        <p:spPr>
-          <a:xfrm>
-            <a:off x="3476918" y="1542311"/>
-            <a:ext cx="431145" cy="369332"/>
-          </a:xfrm>
-          <a:prstGeom prst="rect">
-            <a:avLst/>
-          </a:prstGeom>
-          <a:noFill/>
-          <a:ln>
-            <a:noFill/>
-          </a:ln>
-        </p:spPr>
-        <p:txBody>
-          <a:bodyPr wrap="square" rtlCol="0">
-            <a:spAutoFit/>
-          </a:bodyPr>
-          <a:lstStyle/>
-          <a:p>
-            <a:r>
-              <a:rPr lang="en-US">
-                <a:solidFill>
-                  <a:schemeClr val="tx1">
-                    <a:lumMod val="50000"/>
-                    <a:lumOff val="50000"/>
-                  </a:schemeClr>
-                </a:solidFill>
-              </a:rPr>
-              <a:t>c</a:t>
-            </a:r>
-          </a:p>
-        </p:txBody>
-      </p:sp>
-      <p:sp>
-        <p:nvSpPr>
-          <p:cNvPr id="53" name="TextBox 52">
-            <a:extLst>
-              <a:ext uri="{FF2B5EF4-FFF2-40B4-BE49-F238E27FC236}">
-                <a16:creationId xmlns:a16="http://schemas.microsoft.com/office/drawing/2014/main" id="{1BCABE02-3CAC-464B-B053-419B7D1B7AD9}"/>
-              </a:ext>
-            </a:extLst>
-          </p:cNvPr>
-          <p:cNvSpPr txBox="1"/>
-          <p:nvPr/>
-        </p:nvSpPr>
-        <p:spPr>
-          <a:xfrm>
-            <a:off x="780582" y="2779002"/>
-            <a:ext cx="431145" cy="369332"/>
-          </a:xfrm>
-          <a:prstGeom prst="rect">
-            <a:avLst/>
-          </a:prstGeom>
-          <a:noFill/>
-          <a:ln>
-            <a:noFill/>
-          </a:ln>
-        </p:spPr>
-        <p:txBody>
-          <a:bodyPr wrap="square" rtlCol="0">
-            <a:spAutoFit/>
-          </a:bodyPr>
-          <a:lstStyle/>
-          <a:p>
-            <a:r>
-              <a:rPr lang="en-US">
-                <a:solidFill>
-                  <a:schemeClr val="tx1">
-                    <a:lumMod val="50000"/>
-                    <a:lumOff val="50000"/>
-                  </a:schemeClr>
-                </a:solidFill>
-              </a:rPr>
-              <a:t>y</a:t>
-            </a:r>
-          </a:p>
-        </p:txBody>
-      </p:sp>
-      <p:graphicFrame>
-        <p:nvGraphicFramePr>
           <p:cNvPr id="2" name="Table 1">
             <a:extLst>
               <a:ext uri="{FF2B5EF4-FFF2-40B4-BE49-F238E27FC236}">
@@ -3921,7 +3345,7 @@
           <p:nvPr>
             <p:extLst>
               <p:ext uri="{D42A27DB-BD31-4B8C-83A1-F6EECF244321}">
-                <p14:modId xmlns:p14="http://schemas.microsoft.com/office/powerpoint/2010/main" val="313309103"/>
+                <p14:modId xmlns:p14="http://schemas.microsoft.com/office/powerpoint/2010/main" val="447859444"/>
               </p:ext>
             </p:extLst>
           </p:nvPr>
@@ -4010,7 +3434,7 @@
                       <a:headEnd type="none" w="med" len="med"/>
                       <a:tailEnd type="none" w="med" len="med"/>
                     </a:lnT>
-                    <a:lnB w="12700" cap="flat" cmpd="sng" algn="ctr">
+                    <a:lnB w="19050" cap="flat" cmpd="sng" algn="ctr">
                       <a:solidFill>
                         <a:schemeClr val="tx1"/>
                       </a:solidFill>
@@ -4087,7 +3511,7 @@
                       <a:headEnd type="none" w="med" len="med"/>
                       <a:tailEnd type="none" w="med" len="med"/>
                     </a:lnT>
-                    <a:lnB w="12700" cap="flat" cmpd="sng" algn="ctr">
+                    <a:lnB w="19050" cap="flat" cmpd="sng" algn="ctr">
                       <a:solidFill>
                         <a:schemeClr val="tx1"/>
                       </a:solidFill>
@@ -4150,7 +3574,7 @@
                     </a:p>
                   </a:txBody>
                   <a:tcPr horzOverflow="overflow">
-                    <a:lnL w="12700" cap="flat" cmpd="sng" algn="ctr">
+                    <a:lnL w="19050" cap="flat" cmpd="sng" algn="ctr">
                       <a:solidFill>
                         <a:schemeClr val="tx1"/>
                       </a:solidFill>
@@ -4159,7 +3583,7 @@
                       <a:headEnd type="none" w="med" len="med"/>
                       <a:tailEnd type="none" w="med" len="med"/>
                     </a:lnL>
-                    <a:lnR w="12700" cap="flat" cmpd="sng" algn="ctr">
+                    <a:lnR w="19050" cap="flat" cmpd="sng" algn="ctr">
                       <a:solidFill>
                         <a:schemeClr val="tx1"/>
                       </a:solidFill>
@@ -4168,7 +3592,7 @@
                       <a:headEnd type="none" w="med" len="med"/>
                       <a:tailEnd type="none" w="med" len="med"/>
                     </a:lnR>
-                    <a:lnT w="12700" cap="flat" cmpd="sng" algn="ctr">
+                    <a:lnT w="19050" cap="flat" cmpd="sng" algn="ctr">
                       <a:solidFill>
                         <a:schemeClr val="tx1"/>
                       </a:solidFill>
@@ -4177,7 +3601,7 @@
                       <a:headEnd type="none" w="med" len="med"/>
                       <a:tailEnd type="none" w="med" len="med"/>
                     </a:lnT>
-                    <a:lnB w="12700" cap="flat" cmpd="sng" algn="ctr">
+                    <a:lnB w="19050" cap="flat" cmpd="sng" algn="ctr">
                       <a:solidFill>
                         <a:schemeClr val="tx1"/>
                       </a:solidFill>
@@ -4233,7 +3657,7 @@
                     </a:p>
                   </a:txBody>
                   <a:tcPr horzOverflow="overflow">
-                    <a:lnL w="12700" cap="flat" cmpd="sng" algn="ctr">
+                    <a:lnL w="19050" cap="flat" cmpd="sng" algn="ctr">
                       <a:solidFill>
                         <a:schemeClr val="tx1"/>
                       </a:solidFill>
@@ -4242,7 +3666,7 @@
                       <a:headEnd type="none" w="med" len="med"/>
                       <a:tailEnd type="none" w="med" len="med"/>
                     </a:lnL>
-                    <a:lnR w="12700" cap="flat" cmpd="sng" algn="ctr">
+                    <a:lnR w="19050" cap="flat" cmpd="sng" algn="ctr">
                       <a:solidFill>
                         <a:schemeClr val="tx1"/>
                       </a:solidFill>
@@ -4251,7 +3675,7 @@
                       <a:headEnd type="none" w="med" len="med"/>
                       <a:tailEnd type="none" w="med" len="med"/>
                     </a:lnR>
-                    <a:lnT w="12700" cap="flat" cmpd="sng" algn="ctr">
+                    <a:lnT w="19050" cap="flat" cmpd="sng" algn="ctr">
                       <a:solidFill>
                         <a:schemeClr val="tx1"/>
                       </a:solidFill>
@@ -4260,7 +3684,7 @@
                       <a:headEnd type="none" w="med" len="med"/>
                       <a:tailEnd type="none" w="med" len="med"/>
                     </a:lnT>
-                    <a:lnB w="12700" cap="flat" cmpd="sng" algn="ctr">
+                    <a:lnB w="19050" cap="flat" cmpd="sng" algn="ctr">
                       <a:solidFill>
                         <a:schemeClr val="tx1"/>
                       </a:solidFill>
@@ -4323,7 +3747,7 @@
                     </a:p>
                   </a:txBody>
                   <a:tcPr horzOverflow="overflow">
-                    <a:lnL w="12700" cap="flat" cmpd="sng" algn="ctr">
+                    <a:lnL w="19050" cap="flat" cmpd="sng" algn="ctr">
                       <a:solidFill>
                         <a:schemeClr val="tx1"/>
                       </a:solidFill>
@@ -4332,7 +3756,7 @@
                       <a:headEnd type="none" w="med" len="med"/>
                       <a:tailEnd type="none" w="med" len="med"/>
                     </a:lnL>
-                    <a:lnR w="12700" cap="flat" cmpd="sng" algn="ctr">
+                    <a:lnR w="19050" cap="flat" cmpd="sng" algn="ctr">
                       <a:solidFill>
                         <a:schemeClr val="tx1"/>
                       </a:solidFill>
@@ -4341,7 +3765,7 @@
                       <a:headEnd type="none" w="med" len="med"/>
                       <a:tailEnd type="none" w="med" len="med"/>
                     </a:lnR>
-                    <a:lnT w="12700" cap="flat" cmpd="sng" algn="ctr">
+                    <a:lnT w="19050" cap="flat" cmpd="sng" algn="ctr">
                       <a:solidFill>
                         <a:schemeClr val="tx1"/>
                       </a:solidFill>
@@ -4350,7 +3774,7 @@
                       <a:headEnd type="none" w="med" len="med"/>
                       <a:tailEnd type="none" w="med" len="med"/>
                     </a:lnT>
-                    <a:lnB w="12700" cap="flat" cmpd="sng" algn="ctr">
+                    <a:lnB w="19050" cap="flat" cmpd="sng" algn="ctr">
                       <a:solidFill>
                         <a:schemeClr val="tx1"/>
                       </a:solidFill>
@@ -4406,7 +3830,7 @@
                     </a:p>
                   </a:txBody>
                   <a:tcPr horzOverflow="overflow">
-                    <a:lnL w="12700" cap="flat" cmpd="sng" algn="ctr">
+                    <a:lnL w="19050" cap="flat" cmpd="sng" algn="ctr">
                       <a:solidFill>
                         <a:schemeClr val="tx1"/>
                       </a:solidFill>
@@ -4415,7 +3839,7 @@
                       <a:headEnd type="none" w="med" len="med"/>
                       <a:tailEnd type="none" w="med" len="med"/>
                     </a:lnL>
-                    <a:lnR w="12700" cap="flat" cmpd="sng" algn="ctr">
+                    <a:lnR w="19050" cap="flat" cmpd="sng" algn="ctr">
                       <a:solidFill>
                         <a:schemeClr val="tx1"/>
                       </a:solidFill>
@@ -4424,7 +3848,7 @@
                       <a:headEnd type="none" w="med" len="med"/>
                       <a:tailEnd type="none" w="med" len="med"/>
                     </a:lnR>
-                    <a:lnT w="12700" cap="flat" cmpd="sng" algn="ctr">
+                    <a:lnT w="19050" cap="flat" cmpd="sng" algn="ctr">
                       <a:solidFill>
                         <a:schemeClr val="tx1"/>
                       </a:solidFill>
@@ -4433,7 +3857,7 @@
                       <a:headEnd type="none" w="med" len="med"/>
                       <a:tailEnd type="none" w="med" len="med"/>
                     </a:lnT>
-                    <a:lnB w="12700" cap="flat" cmpd="sng" algn="ctr">
+                    <a:lnB w="19050" cap="flat" cmpd="sng" algn="ctr">
                       <a:solidFill>
                         <a:schemeClr val="tx1"/>
                       </a:solidFill>
@@ -4496,7 +3920,7 @@
                     </a:p>
                   </a:txBody>
                   <a:tcPr horzOverflow="overflow">
-                    <a:lnL w="12700" cap="flat" cmpd="sng" algn="ctr">
+                    <a:lnL w="19050" cap="flat" cmpd="sng" algn="ctr">
                       <a:solidFill>
                         <a:schemeClr val="tx1"/>
                       </a:solidFill>
@@ -4505,7 +3929,7 @@
                       <a:headEnd type="none" w="med" len="med"/>
                       <a:tailEnd type="none" w="med" len="med"/>
                     </a:lnL>
-                    <a:lnR w="12700" cap="flat" cmpd="sng" algn="ctr">
+                    <a:lnR w="19050" cap="flat" cmpd="sng" algn="ctr">
                       <a:solidFill>
                         <a:schemeClr val="tx1"/>
                       </a:solidFill>
@@ -4514,7 +3938,7 @@
                       <a:headEnd type="none" w="med" len="med"/>
                       <a:tailEnd type="none" w="med" len="med"/>
                     </a:lnR>
-                    <a:lnT w="12700" cap="flat" cmpd="sng" algn="ctr">
+                    <a:lnT w="19050" cap="flat" cmpd="sng" algn="ctr">
                       <a:solidFill>
                         <a:schemeClr val="tx1"/>
                       </a:solidFill>
@@ -4523,7 +3947,7 @@
                       <a:headEnd type="none" w="med" len="med"/>
                       <a:tailEnd type="none" w="med" len="med"/>
                     </a:lnT>
-                    <a:lnB w="12700" cap="flat" cmpd="sng" algn="ctr">
+                    <a:lnB w="19050" cap="flat" cmpd="sng" algn="ctr">
                       <a:solidFill>
                         <a:schemeClr val="tx1"/>
                       </a:solidFill>
@@ -4579,7 +4003,7 @@
                     </a:p>
                   </a:txBody>
                   <a:tcPr horzOverflow="overflow">
-                    <a:lnL w="12700" cap="flat" cmpd="sng" algn="ctr">
+                    <a:lnL w="19050" cap="flat" cmpd="sng" algn="ctr">
                       <a:solidFill>
                         <a:schemeClr val="tx1"/>
                       </a:solidFill>
@@ -4588,7 +4012,7 @@
                       <a:headEnd type="none" w="med" len="med"/>
                       <a:tailEnd type="none" w="med" len="med"/>
                     </a:lnL>
-                    <a:lnR w="12700" cap="flat" cmpd="sng" algn="ctr">
+                    <a:lnR w="19050" cap="flat" cmpd="sng" algn="ctr">
                       <a:solidFill>
                         <a:schemeClr val="tx1"/>
                       </a:solidFill>
@@ -4597,7 +4021,7 @@
                       <a:headEnd type="none" w="med" len="med"/>
                       <a:tailEnd type="none" w="med" len="med"/>
                     </a:lnR>
-                    <a:lnT w="12700" cap="flat" cmpd="sng" algn="ctr">
+                    <a:lnT w="19050" cap="flat" cmpd="sng" algn="ctr">
                       <a:solidFill>
                         <a:schemeClr val="tx1"/>
                       </a:solidFill>
@@ -4606,7 +4030,7 @@
                       <a:headEnd type="none" w="med" len="med"/>
                       <a:tailEnd type="none" w="med" len="med"/>
                     </a:lnT>
-                    <a:lnB w="12700" cap="flat" cmpd="sng" algn="ctr">
+                    <a:lnB w="19050" cap="flat" cmpd="sng" algn="ctr">
                       <a:solidFill>
                         <a:schemeClr val="tx1"/>
                       </a:solidFill>
@@ -4669,7 +4093,7 @@
                     </a:p>
                   </a:txBody>
                   <a:tcPr horzOverflow="overflow">
-                    <a:lnL w="12700" cap="flat" cmpd="sng" algn="ctr">
+                    <a:lnL w="19050" cap="flat" cmpd="sng" algn="ctr">
                       <a:solidFill>
                         <a:schemeClr val="tx1"/>
                       </a:solidFill>
@@ -4678,7 +4102,7 @@
                       <a:headEnd type="none" w="med" len="med"/>
                       <a:tailEnd type="none" w="med" len="med"/>
                     </a:lnL>
-                    <a:lnR w="12700" cap="flat" cmpd="sng" algn="ctr">
+                    <a:lnR w="19050" cap="flat" cmpd="sng" algn="ctr">
                       <a:solidFill>
                         <a:schemeClr val="tx1"/>
                       </a:solidFill>
@@ -4687,7 +4111,7 @@
                       <a:headEnd type="none" w="med" len="med"/>
                       <a:tailEnd type="none" w="med" len="med"/>
                     </a:lnR>
-                    <a:lnT w="12700" cap="flat" cmpd="sng" algn="ctr">
+                    <a:lnT w="19050" cap="flat" cmpd="sng" algn="ctr">
                       <a:solidFill>
                         <a:schemeClr val="tx1"/>
                       </a:solidFill>
@@ -4696,7 +4120,7 @@
                       <a:headEnd type="none" w="med" len="med"/>
                       <a:tailEnd type="none" w="med" len="med"/>
                     </a:lnT>
-                    <a:lnB w="12700" cap="flat" cmpd="sng" algn="ctr">
+                    <a:lnB w="19050" cap="flat" cmpd="sng" algn="ctr">
                       <a:solidFill>
                         <a:schemeClr val="tx1"/>
                       </a:solidFill>
@@ -4752,7 +4176,7 @@
                     </a:p>
                   </a:txBody>
                   <a:tcPr horzOverflow="overflow">
-                    <a:lnL w="12700" cap="flat" cmpd="sng" algn="ctr">
+                    <a:lnL w="19050" cap="flat" cmpd="sng" algn="ctr">
                       <a:solidFill>
                         <a:schemeClr val="tx1"/>
                       </a:solidFill>
@@ -4761,7 +4185,7 @@
                       <a:headEnd type="none" w="med" len="med"/>
                       <a:tailEnd type="none" w="med" len="med"/>
                     </a:lnL>
-                    <a:lnR w="12700" cap="flat" cmpd="sng" algn="ctr">
+                    <a:lnR w="19050" cap="flat" cmpd="sng" algn="ctr">
                       <a:solidFill>
                         <a:schemeClr val="tx1"/>
                       </a:solidFill>
@@ -4770,7 +4194,7 @@
                       <a:headEnd type="none" w="med" len="med"/>
                       <a:tailEnd type="none" w="med" len="med"/>
                     </a:lnR>
-                    <a:lnT w="12700" cap="flat" cmpd="sng" algn="ctr">
+                    <a:lnT w="19050" cap="flat" cmpd="sng" algn="ctr">
                       <a:solidFill>
                         <a:schemeClr val="tx1"/>
                       </a:solidFill>
@@ -4779,7 +4203,7 @@
                       <a:headEnd type="none" w="med" len="med"/>
                       <a:tailEnd type="none" w="med" len="med"/>
                     </a:lnT>
-                    <a:lnB w="12700" cap="flat" cmpd="sng" algn="ctr">
+                    <a:lnB w="19050" cap="flat" cmpd="sng" algn="ctr">
                       <a:solidFill>
                         <a:schemeClr val="tx1"/>
                       </a:solidFill>
@@ -4807,6 +4231,1233 @@
           </a:graphicData>
         </a:graphic>
       </p:graphicFrame>
+      <p:grpSp>
+        <p:nvGrpSpPr>
+          <p:cNvPr id="55" name="Group 54">
+            <a:extLst>
+              <a:ext uri="{FF2B5EF4-FFF2-40B4-BE49-F238E27FC236}">
+                <a16:creationId xmlns:a16="http://schemas.microsoft.com/office/drawing/2014/main" id="{45607293-3380-4243-8AE3-C868750E245F}"/>
+              </a:ext>
+            </a:extLst>
+          </p:cNvPr>
+          <p:cNvGrpSpPr/>
+          <p:nvPr/>
+        </p:nvGrpSpPr>
+        <p:grpSpPr>
+          <a:xfrm>
+            <a:off x="780582" y="1396245"/>
+            <a:ext cx="3104620" cy="1779133"/>
+            <a:chOff x="780582" y="1396245"/>
+            <a:chExt cx="3104620" cy="1779133"/>
+          </a:xfrm>
+        </p:grpSpPr>
+        <p:sp>
+          <p:nvSpPr>
+            <p:cNvPr id="50" name="TextBox 49">
+              <a:extLst>
+                <a:ext uri="{FF2B5EF4-FFF2-40B4-BE49-F238E27FC236}">
+                  <a16:creationId xmlns:a16="http://schemas.microsoft.com/office/drawing/2014/main" id="{4D6AE011-D17C-46EB-AF9C-1729C32F7EAA}"/>
+                </a:ext>
+              </a:extLst>
+            </p:cNvPr>
+            <p:cNvSpPr txBox="1"/>
+            <p:nvPr/>
+          </p:nvSpPr>
+          <p:spPr>
+            <a:xfrm>
+              <a:off x="780582" y="1396245"/>
+              <a:ext cx="431145" cy="369332"/>
+            </a:xfrm>
+            <a:prstGeom prst="rect">
+              <a:avLst/>
+            </a:prstGeom>
+            <a:noFill/>
+            <a:ln>
+              <a:noFill/>
+            </a:ln>
+          </p:spPr>
+          <p:txBody>
+            <a:bodyPr wrap="square" rtlCol="0">
+              <a:spAutoFit/>
+            </a:bodyPr>
+            <a:lstStyle/>
+            <a:p>
+              <a:r>
+                <a:rPr lang="en-US"/>
+                <a:t>x</a:t>
+              </a:r>
+            </a:p>
+          </p:txBody>
+        </p:sp>
+        <p:grpSp>
+          <p:nvGrpSpPr>
+            <p:cNvPr id="48" name="Group 47">
+              <a:extLst>
+                <a:ext uri="{FF2B5EF4-FFF2-40B4-BE49-F238E27FC236}">
+                  <a16:creationId xmlns:a16="http://schemas.microsoft.com/office/drawing/2014/main" id="{76D32728-C052-42C1-B684-1DE279BCADBD}"/>
+                </a:ext>
+              </a:extLst>
+            </p:cNvPr>
+            <p:cNvGrpSpPr/>
+            <p:nvPr/>
+          </p:nvGrpSpPr>
+          <p:grpSpPr>
+            <a:xfrm>
+              <a:off x="3450247" y="1542311"/>
+              <a:ext cx="434955" cy="1365354"/>
+              <a:chOff x="3435007" y="1542311"/>
+              <a:chExt cx="434955" cy="1365354"/>
+            </a:xfrm>
+          </p:grpSpPr>
+          <p:sp>
+            <p:nvSpPr>
+              <p:cNvPr id="51" name="TextBox 50">
+                <a:extLst>
+                  <a:ext uri="{FF2B5EF4-FFF2-40B4-BE49-F238E27FC236}">
+                    <a16:creationId xmlns:a16="http://schemas.microsoft.com/office/drawing/2014/main" id="{38BCC1A8-E34B-4222-9EF0-DDCD15984C85}"/>
+                  </a:ext>
+                </a:extLst>
+              </p:cNvPr>
+              <p:cNvSpPr txBox="1"/>
+              <p:nvPr/>
+            </p:nvSpPr>
+            <p:spPr>
+              <a:xfrm>
+                <a:off x="3438817" y="2538333"/>
+                <a:ext cx="431145" cy="369332"/>
+              </a:xfrm>
+              <a:prstGeom prst="rect">
+                <a:avLst/>
+              </a:prstGeom>
+              <a:noFill/>
+              <a:ln>
+                <a:noFill/>
+              </a:ln>
+            </p:spPr>
+            <p:txBody>
+              <a:bodyPr wrap="square" rtlCol="0">
+                <a:spAutoFit/>
+              </a:bodyPr>
+              <a:lstStyle/>
+              <a:p>
+                <a:r>
+                  <a:rPr lang="en-US"/>
+                  <a:t>s</a:t>
+                </a:r>
+              </a:p>
+            </p:txBody>
+          </p:sp>
+          <p:sp>
+            <p:nvSpPr>
+              <p:cNvPr id="52" name="TextBox 51">
+                <a:extLst>
+                  <a:ext uri="{FF2B5EF4-FFF2-40B4-BE49-F238E27FC236}">
+                    <a16:creationId xmlns:a16="http://schemas.microsoft.com/office/drawing/2014/main" id="{57EB6943-2179-4CFD-8F7E-25DB73F2FD26}"/>
+                  </a:ext>
+                </a:extLst>
+              </p:cNvPr>
+              <p:cNvSpPr txBox="1"/>
+              <p:nvPr/>
+            </p:nvSpPr>
+            <p:spPr>
+              <a:xfrm>
+                <a:off x="3435007" y="1542311"/>
+                <a:ext cx="431145" cy="369332"/>
+              </a:xfrm>
+              <a:prstGeom prst="rect">
+                <a:avLst/>
+              </a:prstGeom>
+              <a:noFill/>
+              <a:ln>
+                <a:noFill/>
+              </a:ln>
+            </p:spPr>
+            <p:txBody>
+              <a:bodyPr wrap="square" rtlCol="0">
+                <a:spAutoFit/>
+              </a:bodyPr>
+              <a:lstStyle/>
+              <a:p>
+                <a:r>
+                  <a:rPr lang="en-US"/>
+                  <a:t>c</a:t>
+                </a:r>
+              </a:p>
+            </p:txBody>
+          </p:sp>
+        </p:grpSp>
+        <p:sp>
+          <p:nvSpPr>
+            <p:cNvPr id="53" name="TextBox 52">
+              <a:extLst>
+                <a:ext uri="{FF2B5EF4-FFF2-40B4-BE49-F238E27FC236}">
+                  <a16:creationId xmlns:a16="http://schemas.microsoft.com/office/drawing/2014/main" id="{1BCABE02-3CAC-464B-B053-419B7D1B7AD9}"/>
+                </a:ext>
+              </a:extLst>
+            </p:cNvPr>
+            <p:cNvSpPr txBox="1"/>
+            <p:nvPr/>
+          </p:nvSpPr>
+          <p:spPr>
+            <a:xfrm>
+              <a:off x="780582" y="2748522"/>
+              <a:ext cx="431145" cy="369332"/>
+            </a:xfrm>
+            <a:prstGeom prst="rect">
+              <a:avLst/>
+            </a:prstGeom>
+            <a:noFill/>
+            <a:ln>
+              <a:noFill/>
+            </a:ln>
+          </p:spPr>
+          <p:txBody>
+            <a:bodyPr wrap="square" rtlCol="0">
+              <a:spAutoFit/>
+            </a:bodyPr>
+            <a:lstStyle/>
+            <a:p>
+              <a:r>
+                <a:rPr lang="en-US"/>
+                <a:t>y</a:t>
+              </a:r>
+            </a:p>
+          </p:txBody>
+        </p:sp>
+        <p:grpSp>
+          <p:nvGrpSpPr>
+            <p:cNvPr id="49" name="Group 48">
+              <a:extLst>
+                <a:ext uri="{FF2B5EF4-FFF2-40B4-BE49-F238E27FC236}">
+                  <a16:creationId xmlns:a16="http://schemas.microsoft.com/office/drawing/2014/main" id="{73922BAE-204C-4581-8DFA-95445170B1B3}"/>
+                </a:ext>
+              </a:extLst>
+            </p:cNvPr>
+            <p:cNvGrpSpPr/>
+            <p:nvPr/>
+          </p:nvGrpSpPr>
+          <p:grpSpPr>
+            <a:xfrm>
+              <a:off x="1077915" y="1448400"/>
+              <a:ext cx="2418053" cy="1726978"/>
+              <a:chOff x="1077915" y="1448400"/>
+              <a:chExt cx="2418053" cy="1726978"/>
+            </a:xfrm>
+          </p:grpSpPr>
+          <p:cxnSp>
+            <p:nvCxnSpPr>
+              <p:cNvPr id="26" name="Straight Connector 25">
+                <a:extLst>
+                  <a:ext uri="{FF2B5EF4-FFF2-40B4-BE49-F238E27FC236}">
+                    <a16:creationId xmlns:a16="http://schemas.microsoft.com/office/drawing/2014/main" id="{D084ECB5-7A06-42E6-904C-0D4192388A70}"/>
+                  </a:ext>
+                </a:extLst>
+              </p:cNvPr>
+              <p:cNvCxnSpPr>
+                <a:cxnSpLocks/>
+              </p:cNvCxnSpPr>
+              <p:nvPr/>
+            </p:nvCxnSpPr>
+            <p:spPr>
+              <a:xfrm flipV="1">
+                <a:off x="1077915" y="2956824"/>
+                <a:ext cx="1349997" cy="1"/>
+              </a:xfrm>
+              <a:prstGeom prst="line">
+                <a:avLst/>
+              </a:prstGeom>
+              <a:ln w="28575">
+                <a:solidFill>
+                  <a:schemeClr val="tx1"/>
+                </a:solidFill>
+              </a:ln>
+            </p:spPr>
+            <p:style>
+              <a:lnRef idx="1">
+                <a:schemeClr val="dk1"/>
+              </a:lnRef>
+              <a:fillRef idx="0">
+                <a:schemeClr val="dk1"/>
+              </a:fillRef>
+              <a:effectRef idx="0">
+                <a:schemeClr val="dk1"/>
+              </a:effectRef>
+              <a:fontRef idx="minor">
+                <a:schemeClr val="tx1"/>
+              </a:fontRef>
+            </p:style>
+          </p:cxnSp>
+          <p:cxnSp>
+            <p:nvCxnSpPr>
+              <p:cNvPr id="31" name="Straight Connector 30">
+                <a:extLst>
+                  <a:ext uri="{FF2B5EF4-FFF2-40B4-BE49-F238E27FC236}">
+                    <a16:creationId xmlns:a16="http://schemas.microsoft.com/office/drawing/2014/main" id="{17729233-E3AB-4444-B9B8-4A76CE631CAC}"/>
+                  </a:ext>
+                </a:extLst>
+              </p:cNvPr>
+              <p:cNvCxnSpPr>
+                <a:cxnSpLocks/>
+              </p:cNvCxnSpPr>
+              <p:nvPr/>
+            </p:nvCxnSpPr>
+            <p:spPr>
+              <a:xfrm flipV="1">
+                <a:off x="1085535" y="1592581"/>
+                <a:ext cx="1342377" cy="1"/>
+              </a:xfrm>
+              <a:prstGeom prst="line">
+                <a:avLst/>
+              </a:prstGeom>
+              <a:ln w="28575">
+                <a:solidFill>
+                  <a:schemeClr val="tx1"/>
+                </a:solidFill>
+              </a:ln>
+            </p:spPr>
+            <p:style>
+              <a:lnRef idx="1">
+                <a:schemeClr val="dk1"/>
+              </a:lnRef>
+              <a:fillRef idx="0">
+                <a:schemeClr val="dk1"/>
+              </a:fillRef>
+              <a:effectRef idx="0">
+                <a:schemeClr val="dk1"/>
+              </a:effectRef>
+              <a:fontRef idx="minor">
+                <a:schemeClr val="tx1"/>
+              </a:fontRef>
+            </p:style>
+          </p:cxnSp>
+          <p:cxnSp>
+            <p:nvCxnSpPr>
+              <p:cNvPr id="35" name="Connector: Elbow 34">
+                <a:extLst>
+                  <a:ext uri="{FF2B5EF4-FFF2-40B4-BE49-F238E27FC236}">
+                    <a16:creationId xmlns:a16="http://schemas.microsoft.com/office/drawing/2014/main" id="{C84542A5-2A0B-4A7A-B465-2B659D06F818}"/>
+                  </a:ext>
+                </a:extLst>
+              </p:cNvPr>
+              <p:cNvCxnSpPr>
+                <a:cxnSpLocks/>
+              </p:cNvCxnSpPr>
+              <p:nvPr/>
+            </p:nvCxnSpPr>
+            <p:spPr>
+              <a:xfrm>
+                <a:off x="1405890" y="1596390"/>
+                <a:ext cx="1058715" cy="1003641"/>
+              </a:xfrm>
+              <a:prstGeom prst="bentConnector3">
+                <a:avLst>
+                  <a:gd name="adj1" fmla="val -22"/>
+                </a:avLst>
+              </a:prstGeom>
+              <a:ln w="28575">
+                <a:solidFill>
+                  <a:schemeClr val="tx1"/>
+                </a:solidFill>
+              </a:ln>
+            </p:spPr>
+            <p:style>
+              <a:lnRef idx="1">
+                <a:schemeClr val="accent1"/>
+              </a:lnRef>
+              <a:fillRef idx="0">
+                <a:schemeClr val="accent1"/>
+              </a:fillRef>
+              <a:effectRef idx="0">
+                <a:schemeClr val="accent1"/>
+              </a:effectRef>
+              <a:fontRef idx="minor">
+                <a:schemeClr val="tx1"/>
+              </a:fontRef>
+            </p:style>
+          </p:cxnSp>
+          <p:cxnSp>
+            <p:nvCxnSpPr>
+              <p:cNvPr id="42" name="Connector: Elbow 41">
+                <a:extLst>
+                  <a:ext uri="{FF2B5EF4-FFF2-40B4-BE49-F238E27FC236}">
+                    <a16:creationId xmlns:a16="http://schemas.microsoft.com/office/drawing/2014/main" id="{27F7499E-544F-4EDC-B698-2865BE31F1EB}"/>
+                  </a:ext>
+                </a:extLst>
+              </p:cNvPr>
+              <p:cNvCxnSpPr>
+                <a:cxnSpLocks/>
+              </p:cNvCxnSpPr>
+              <p:nvPr/>
+            </p:nvCxnSpPr>
+            <p:spPr>
+              <a:xfrm rot="5400000" flipH="1" flipV="1">
+                <a:off x="1667250" y="2207508"/>
+                <a:ext cx="1043435" cy="443790"/>
+              </a:xfrm>
+              <a:prstGeom prst="bentConnector3">
+                <a:avLst>
+                  <a:gd name="adj1" fmla="val 100389"/>
+                </a:avLst>
+              </a:prstGeom>
+              <a:ln w="28575">
+                <a:solidFill>
+                  <a:schemeClr val="tx1"/>
+                </a:solidFill>
+              </a:ln>
+            </p:spPr>
+            <p:style>
+              <a:lnRef idx="1">
+                <a:schemeClr val="accent1"/>
+              </a:lnRef>
+              <a:fillRef idx="0">
+                <a:schemeClr val="accent1"/>
+              </a:fillRef>
+              <a:effectRef idx="0">
+                <a:schemeClr val="accent1"/>
+              </a:effectRef>
+              <a:fontRef idx="minor">
+                <a:schemeClr val="tx1"/>
+              </a:fontRef>
+            </p:style>
+          </p:cxnSp>
+          <p:grpSp>
+            <p:nvGrpSpPr>
+              <p:cNvPr id="13" name="Group 12">
+                <a:extLst>
+                  <a:ext uri="{FF2B5EF4-FFF2-40B4-BE49-F238E27FC236}">
+                    <a16:creationId xmlns:a16="http://schemas.microsoft.com/office/drawing/2014/main" id="{E3FFDCC4-1970-41D3-A7A2-E6B2BFF561F3}"/>
+                  </a:ext>
+                </a:extLst>
+              </p:cNvPr>
+              <p:cNvGrpSpPr/>
+              <p:nvPr/>
+            </p:nvGrpSpPr>
+            <p:grpSpPr>
+              <a:xfrm>
+                <a:off x="2406966" y="1448400"/>
+                <a:ext cx="883840" cy="634354"/>
+                <a:chOff x="1495426" y="764382"/>
+                <a:chExt cx="883840" cy="634354"/>
+              </a:xfrm>
+            </p:grpSpPr>
+            <p:cxnSp>
+              <p:nvCxnSpPr>
+                <p:cNvPr id="14" name="Straight Connector 13">
+                  <a:extLst>
+                    <a:ext uri="{FF2B5EF4-FFF2-40B4-BE49-F238E27FC236}">
+                      <a16:creationId xmlns:a16="http://schemas.microsoft.com/office/drawing/2014/main" id="{AA755343-5811-4291-B3A0-1680D25BD2D7}"/>
+                    </a:ext>
+                  </a:extLst>
+                </p:cNvPr>
+                <p:cNvCxnSpPr>
+                  <a:cxnSpLocks/>
+                </p:cNvCxnSpPr>
+                <p:nvPr/>
+              </p:nvCxnSpPr>
+              <p:spPr>
+                <a:xfrm>
+                  <a:off x="1509852" y="775683"/>
+                  <a:ext cx="5019" cy="623053"/>
+                </a:xfrm>
+                <a:prstGeom prst="line">
+                  <a:avLst/>
+                </a:prstGeom>
+                <a:ln w="28575">
+                  <a:solidFill>
+                    <a:schemeClr val="tx1"/>
+                  </a:solidFill>
+                </a:ln>
+              </p:spPr>
+              <p:style>
+                <a:lnRef idx="1">
+                  <a:schemeClr val="accent1"/>
+                </a:lnRef>
+                <a:fillRef idx="0">
+                  <a:schemeClr val="accent1"/>
+                </a:fillRef>
+                <a:effectRef idx="0">
+                  <a:schemeClr val="accent1"/>
+                </a:effectRef>
+                <a:fontRef idx="minor">
+                  <a:schemeClr val="tx1"/>
+                </a:fontRef>
+              </p:style>
+            </p:cxnSp>
+            <p:grpSp>
+              <p:nvGrpSpPr>
+                <p:cNvPr id="15" name="Group 14">
+                  <a:extLst>
+                    <a:ext uri="{FF2B5EF4-FFF2-40B4-BE49-F238E27FC236}">
+                      <a16:creationId xmlns:a16="http://schemas.microsoft.com/office/drawing/2014/main" id="{7F2F2FEE-947D-4C98-8EAD-341F0082EADB}"/>
+                    </a:ext>
+                  </a:extLst>
+                </p:cNvPr>
+                <p:cNvGrpSpPr/>
+                <p:nvPr/>
+              </p:nvGrpSpPr>
+              <p:grpSpPr>
+                <a:xfrm>
+                  <a:off x="1495426" y="764382"/>
+                  <a:ext cx="883840" cy="623984"/>
+                  <a:chOff x="1495426" y="754590"/>
+                  <a:chExt cx="883840" cy="623984"/>
+                </a:xfrm>
+              </p:grpSpPr>
+              <p:grpSp>
+                <p:nvGrpSpPr>
+                  <p:cNvPr id="16" name="Group 15">
+                    <a:extLst>
+                      <a:ext uri="{FF2B5EF4-FFF2-40B4-BE49-F238E27FC236}">
+                        <a16:creationId xmlns:a16="http://schemas.microsoft.com/office/drawing/2014/main" id="{90BEE999-AEE8-47B7-95D0-FEEE7BDB28C8}"/>
+                      </a:ext>
+                    </a:extLst>
+                  </p:cNvPr>
+                  <p:cNvGrpSpPr/>
+                  <p:nvPr/>
+                </p:nvGrpSpPr>
+                <p:grpSpPr>
+                  <a:xfrm>
+                    <a:off x="1495426" y="755264"/>
+                    <a:ext cx="883839" cy="623310"/>
+                    <a:chOff x="1495426" y="755264"/>
+                    <a:chExt cx="883839" cy="623310"/>
+                  </a:xfrm>
+                </p:grpSpPr>
+                <p:cxnSp>
+                  <p:nvCxnSpPr>
+                    <p:cNvPr id="21" name="Straight Connector 20">
+                      <a:extLst>
+                        <a:ext uri="{FF2B5EF4-FFF2-40B4-BE49-F238E27FC236}">
+                          <a16:creationId xmlns:a16="http://schemas.microsoft.com/office/drawing/2014/main" id="{FECB0616-4890-40F5-9243-74E28F4C0811}"/>
+                        </a:ext>
+                      </a:extLst>
+                    </p:cNvPr>
+                    <p:cNvCxnSpPr>
+                      <a:cxnSpLocks/>
+                    </p:cNvCxnSpPr>
+                    <p:nvPr/>
+                  </p:nvCxnSpPr>
+                  <p:spPr>
+                    <a:xfrm flipH="1">
+                      <a:off x="1495426" y="755264"/>
+                      <a:ext cx="575864" cy="3483"/>
+                    </a:xfrm>
+                    <a:prstGeom prst="line">
+                      <a:avLst/>
+                    </a:prstGeom>
+                    <a:ln w="28575">
+                      <a:solidFill>
+                        <a:schemeClr val="tx1"/>
+                      </a:solidFill>
+                    </a:ln>
+                  </p:spPr>
+                  <p:style>
+                    <a:lnRef idx="1">
+                      <a:schemeClr val="accent1"/>
+                    </a:lnRef>
+                    <a:fillRef idx="0">
+                      <a:schemeClr val="accent1"/>
+                    </a:fillRef>
+                    <a:effectRef idx="0">
+                      <a:schemeClr val="accent1"/>
+                    </a:effectRef>
+                    <a:fontRef idx="minor">
+                      <a:schemeClr val="tx1"/>
+                    </a:fontRef>
+                  </p:style>
+                </p:cxnSp>
+                <p:sp>
+                  <p:nvSpPr>
+                    <p:cNvPr id="22" name="Arc 21">
+                      <a:extLst>
+                        <a:ext uri="{FF2B5EF4-FFF2-40B4-BE49-F238E27FC236}">
+                          <a16:creationId xmlns:a16="http://schemas.microsoft.com/office/drawing/2014/main" id="{1DE9B955-C7C8-48DD-839E-967CC6D584F0}"/>
+                        </a:ext>
+                      </a:extLst>
+                    </p:cNvPr>
+                    <p:cNvSpPr/>
+                    <p:nvPr/>
+                  </p:nvSpPr>
+                  <p:spPr>
+                    <a:xfrm>
+                      <a:off x="1760140" y="755800"/>
+                      <a:ext cx="619125" cy="622774"/>
+                    </a:xfrm>
+                    <a:prstGeom prst="arc">
+                      <a:avLst/>
+                    </a:prstGeom>
+                    <a:ln w="28575">
+                      <a:solidFill>
+                        <a:schemeClr val="tx1"/>
+                      </a:solidFill>
+                    </a:ln>
+                  </p:spPr>
+                  <p:style>
+                    <a:lnRef idx="1">
+                      <a:schemeClr val="accent1"/>
+                    </a:lnRef>
+                    <a:fillRef idx="0">
+                      <a:schemeClr val="accent1"/>
+                    </a:fillRef>
+                    <a:effectRef idx="0">
+                      <a:schemeClr val="accent1"/>
+                    </a:effectRef>
+                    <a:fontRef idx="minor">
+                      <a:schemeClr val="tx1"/>
+                    </a:fontRef>
+                  </p:style>
+                  <p:txBody>
+                    <a:bodyPr rtlCol="0" anchor="ctr"/>
+                    <a:lstStyle/>
+                    <a:p>
+                      <a:pPr algn="ctr"/>
+                      <a:r>
+                        <a:rPr lang="en-US"/>
+                        <a:t>                          </a:t>
+                      </a:r>
+                    </a:p>
+                  </p:txBody>
+                </p:sp>
+              </p:grpSp>
+              <p:grpSp>
+                <p:nvGrpSpPr>
+                  <p:cNvPr id="17" name="Group 16">
+                    <a:extLst>
+                      <a:ext uri="{FF2B5EF4-FFF2-40B4-BE49-F238E27FC236}">
+                        <a16:creationId xmlns:a16="http://schemas.microsoft.com/office/drawing/2014/main" id="{DD11A4EC-A81F-4EAF-825B-BB08B8F9FE90}"/>
+                      </a:ext>
+                    </a:extLst>
+                  </p:cNvPr>
+                  <p:cNvGrpSpPr/>
+                  <p:nvPr/>
+                </p:nvGrpSpPr>
+                <p:grpSpPr>
+                  <a:xfrm flipV="1">
+                    <a:off x="1514475" y="754590"/>
+                    <a:ext cx="864791" cy="622774"/>
+                    <a:chOff x="1514475" y="753418"/>
+                    <a:chExt cx="864791" cy="622774"/>
+                  </a:xfrm>
+                </p:grpSpPr>
+                <p:cxnSp>
+                  <p:nvCxnSpPr>
+                    <p:cNvPr id="19" name="Straight Connector 18">
+                      <a:extLst>
+                        <a:ext uri="{FF2B5EF4-FFF2-40B4-BE49-F238E27FC236}">
+                          <a16:creationId xmlns:a16="http://schemas.microsoft.com/office/drawing/2014/main" id="{C6CAC33E-BD69-4379-8CD9-640F8123D0BE}"/>
+                        </a:ext>
+                      </a:extLst>
+                    </p:cNvPr>
+                    <p:cNvCxnSpPr>
+                      <a:cxnSpLocks/>
+                    </p:cNvCxnSpPr>
+                    <p:nvPr/>
+                  </p:nvCxnSpPr>
+                  <p:spPr>
+                    <a:xfrm flipH="1">
+                      <a:off x="1514475" y="754588"/>
+                      <a:ext cx="558424" cy="1777"/>
+                    </a:xfrm>
+                    <a:prstGeom prst="line">
+                      <a:avLst/>
+                    </a:prstGeom>
+                    <a:ln w="28575">
+                      <a:solidFill>
+                        <a:schemeClr val="tx1"/>
+                      </a:solidFill>
+                    </a:ln>
+                  </p:spPr>
+                  <p:style>
+                    <a:lnRef idx="1">
+                      <a:schemeClr val="accent1"/>
+                    </a:lnRef>
+                    <a:fillRef idx="0">
+                      <a:schemeClr val="accent1"/>
+                    </a:fillRef>
+                    <a:effectRef idx="0">
+                      <a:schemeClr val="accent1"/>
+                    </a:effectRef>
+                    <a:fontRef idx="minor">
+                      <a:schemeClr val="tx1"/>
+                    </a:fontRef>
+                  </p:style>
+                </p:cxnSp>
+                <p:sp>
+                  <p:nvSpPr>
+                    <p:cNvPr id="20" name="Arc 19">
+                      <a:extLst>
+                        <a:ext uri="{FF2B5EF4-FFF2-40B4-BE49-F238E27FC236}">
+                          <a16:creationId xmlns:a16="http://schemas.microsoft.com/office/drawing/2014/main" id="{807F2F0D-4871-4F6F-8E2D-CB9D2FF82213}"/>
+                        </a:ext>
+                      </a:extLst>
+                    </p:cNvPr>
+                    <p:cNvSpPr/>
+                    <p:nvPr/>
+                  </p:nvSpPr>
+                  <p:spPr>
+                    <a:xfrm>
+                      <a:off x="1760141" y="753418"/>
+                      <a:ext cx="619125" cy="622774"/>
+                    </a:xfrm>
+                    <a:prstGeom prst="arc">
+                      <a:avLst/>
+                    </a:prstGeom>
+                    <a:ln w="28575">
+                      <a:solidFill>
+                        <a:schemeClr val="tx1"/>
+                      </a:solidFill>
+                    </a:ln>
+                  </p:spPr>
+                  <p:style>
+                    <a:lnRef idx="1">
+                      <a:schemeClr val="accent1"/>
+                    </a:lnRef>
+                    <a:fillRef idx="0">
+                      <a:schemeClr val="accent1"/>
+                    </a:fillRef>
+                    <a:effectRef idx="0">
+                      <a:schemeClr val="accent1"/>
+                    </a:effectRef>
+                    <a:fontRef idx="minor">
+                      <a:schemeClr val="tx1"/>
+                    </a:fontRef>
+                  </p:style>
+                  <p:txBody>
+                    <a:bodyPr rtlCol="0" anchor="ctr"/>
+                    <a:lstStyle/>
+                    <a:p>
+                      <a:pPr algn="ctr"/>
+                      <a:r>
+                        <a:rPr lang="en-US"/>
+                        <a:t>                          </a:t>
+                      </a:r>
+                    </a:p>
+                  </p:txBody>
+                </p:sp>
+              </p:grpSp>
+            </p:grpSp>
+          </p:grpSp>
+          <p:grpSp>
+            <p:nvGrpSpPr>
+              <p:cNvPr id="23" name="Group 22">
+                <a:extLst>
+                  <a:ext uri="{FF2B5EF4-FFF2-40B4-BE49-F238E27FC236}">
+                    <a16:creationId xmlns:a16="http://schemas.microsoft.com/office/drawing/2014/main" id="{046B4DB1-1C6E-42C1-AAA4-B5EA21047FBA}"/>
+                  </a:ext>
+                </a:extLst>
+              </p:cNvPr>
+              <p:cNvGrpSpPr/>
+              <p:nvPr/>
+            </p:nvGrpSpPr>
+            <p:grpSpPr>
+              <a:xfrm>
+                <a:off x="1613901" y="2295604"/>
+                <a:ext cx="1676905" cy="879774"/>
+                <a:chOff x="3472014" y="2243816"/>
+                <a:chExt cx="1676905" cy="879774"/>
+              </a:xfrm>
+            </p:grpSpPr>
+            <p:sp>
+              <p:nvSpPr>
+                <p:cNvPr id="24" name="Arc 23">
+                  <a:extLst>
+                    <a:ext uri="{FF2B5EF4-FFF2-40B4-BE49-F238E27FC236}">
+                      <a16:creationId xmlns:a16="http://schemas.microsoft.com/office/drawing/2014/main" id="{2762A3CB-7FBC-4107-864F-941C8F3BFD2F}"/>
+                    </a:ext>
+                  </a:extLst>
+                </p:cNvPr>
+                <p:cNvSpPr/>
+                <p:nvPr/>
+              </p:nvSpPr>
+              <p:spPr>
+                <a:xfrm rot="2700000">
+                  <a:off x="3561129" y="2250742"/>
+                  <a:ext cx="879774" cy="865921"/>
+                </a:xfrm>
+                <a:prstGeom prst="arc">
+                  <a:avLst>
+                    <a:gd name="adj1" fmla="val 16287124"/>
+                    <a:gd name="adj2" fmla="val 0"/>
+                  </a:avLst>
+                </a:prstGeom>
+                <a:ln w="28575">
+                  <a:solidFill>
+                    <a:schemeClr val="tx1"/>
+                  </a:solidFill>
+                </a:ln>
+              </p:spPr>
+              <p:style>
+                <a:lnRef idx="1">
+                  <a:schemeClr val="accent1"/>
+                </a:lnRef>
+                <a:fillRef idx="0">
+                  <a:schemeClr val="accent1"/>
+                </a:fillRef>
+                <a:effectRef idx="0">
+                  <a:schemeClr val="accent1"/>
+                </a:effectRef>
+                <a:fontRef idx="minor">
+                  <a:schemeClr val="tx1"/>
+                </a:fontRef>
+              </p:style>
+              <p:txBody>
+                <a:bodyPr rtlCol="0" anchor="ctr"/>
+                <a:lstStyle/>
+                <a:p>
+                  <a:pPr algn="ctr"/>
+                  <a:endParaRPr lang="en-US"/>
+                </a:p>
+              </p:txBody>
+            </p:sp>
+            <p:grpSp>
+              <p:nvGrpSpPr>
+                <p:cNvPr id="25" name="Group 24">
+                  <a:extLst>
+                    <a:ext uri="{FF2B5EF4-FFF2-40B4-BE49-F238E27FC236}">
+                      <a16:creationId xmlns:a16="http://schemas.microsoft.com/office/drawing/2014/main" id="{10801022-83CE-4D3B-8E48-0C94A1B9DB68}"/>
+                    </a:ext>
+                  </a:extLst>
+                </p:cNvPr>
+                <p:cNvGrpSpPr/>
+                <p:nvPr/>
+              </p:nvGrpSpPr>
+              <p:grpSpPr>
+                <a:xfrm>
+                  <a:off x="4301194" y="2381749"/>
+                  <a:ext cx="847725" cy="619126"/>
+                  <a:chOff x="3797697" y="831056"/>
+                  <a:chExt cx="847725" cy="619126"/>
+                </a:xfrm>
+              </p:grpSpPr>
+              <p:grpSp>
+                <p:nvGrpSpPr>
+                  <p:cNvPr id="28" name="Group 27">
+                    <a:extLst>
+                      <a:ext uri="{FF2B5EF4-FFF2-40B4-BE49-F238E27FC236}">
+                        <a16:creationId xmlns:a16="http://schemas.microsoft.com/office/drawing/2014/main" id="{97E0F226-55C4-4881-B7E9-2CB4D8271E82}"/>
+                      </a:ext>
+                    </a:extLst>
+                  </p:cNvPr>
+                  <p:cNvGrpSpPr/>
+                  <p:nvPr/>
+                </p:nvGrpSpPr>
+                <p:grpSpPr>
+                  <a:xfrm>
+                    <a:off x="4048125" y="833438"/>
+                    <a:ext cx="597297" cy="615965"/>
+                    <a:chOff x="4048125" y="833438"/>
+                    <a:chExt cx="597297" cy="615965"/>
+                  </a:xfrm>
+                </p:grpSpPr>
+                <p:sp>
+                  <p:nvSpPr>
+                    <p:cNvPr id="32" name="Freeform: Shape 31">
+                      <a:extLst>
+                        <a:ext uri="{FF2B5EF4-FFF2-40B4-BE49-F238E27FC236}">
+                          <a16:creationId xmlns:a16="http://schemas.microsoft.com/office/drawing/2014/main" id="{AD99BE68-E162-4E99-919E-6F5A866B685E}"/>
+                        </a:ext>
+                      </a:extLst>
+                    </p:cNvPr>
+                    <p:cNvSpPr/>
+                    <p:nvPr/>
+                  </p:nvSpPr>
+                  <p:spPr>
+                    <a:xfrm>
+                      <a:off x="4048125" y="833438"/>
+                      <a:ext cx="592931" cy="316706"/>
+                    </a:xfrm>
+                    <a:custGeom>
+                      <a:avLst/>
+                      <a:gdLst>
+                        <a:gd name="connsiteX0" fmla="*/ 0 w 592931"/>
+                        <a:gd name="connsiteY0" fmla="*/ 0 h 316706"/>
+                        <a:gd name="connsiteX1" fmla="*/ 340519 w 592931"/>
+                        <a:gd name="connsiteY1" fmla="*/ 97631 h 316706"/>
+                        <a:gd name="connsiteX2" fmla="*/ 592931 w 592931"/>
+                        <a:gd name="connsiteY2" fmla="*/ 316706 h 316706"/>
+                      </a:gdLst>
+                      <a:ahLst/>
+                      <a:cxnLst>
+                        <a:cxn ang="0">
+                          <a:pos x="connsiteX0" y="connsiteY0"/>
+                        </a:cxn>
+                        <a:cxn ang="0">
+                          <a:pos x="connsiteX1" y="connsiteY1"/>
+                        </a:cxn>
+                        <a:cxn ang="0">
+                          <a:pos x="connsiteX2" y="connsiteY2"/>
+                        </a:cxn>
+                      </a:cxnLst>
+                      <a:rect l="l" t="t" r="r" b="b"/>
+                      <a:pathLst>
+                        <a:path w="592931" h="316706">
+                          <a:moveTo>
+                            <a:pt x="0" y="0"/>
+                          </a:moveTo>
+                          <a:cubicBezTo>
+                            <a:pt x="120848" y="22423"/>
+                            <a:pt x="241697" y="44847"/>
+                            <a:pt x="340519" y="97631"/>
+                          </a:cubicBezTo>
+                          <a:cubicBezTo>
+                            <a:pt x="439341" y="150415"/>
+                            <a:pt x="516136" y="233560"/>
+                            <a:pt x="592931" y="316706"/>
+                          </a:cubicBezTo>
+                        </a:path>
+                      </a:pathLst>
+                    </a:custGeom>
+                    <a:noFill/>
+                    <a:ln w="28575">
+                      <a:solidFill>
+                        <a:schemeClr val="tx1"/>
+                      </a:solidFill>
+                    </a:ln>
+                  </p:spPr>
+                  <p:style>
+                    <a:lnRef idx="2">
+                      <a:schemeClr val="accent1">
+                        <a:shade val="50000"/>
+                      </a:schemeClr>
+                    </a:lnRef>
+                    <a:fillRef idx="1">
+                      <a:schemeClr val="accent1"/>
+                    </a:fillRef>
+                    <a:effectRef idx="0">
+                      <a:schemeClr val="accent1"/>
+                    </a:effectRef>
+                    <a:fontRef idx="minor">
+                      <a:schemeClr val="lt1"/>
+                    </a:fontRef>
+                  </p:style>
+                  <p:txBody>
+                    <a:bodyPr rtlCol="0" anchor="ctr"/>
+                    <a:lstStyle/>
+                    <a:p>
+                      <a:pPr algn="ctr"/>
+                      <a:endParaRPr lang="en-US"/>
+                    </a:p>
+                  </p:txBody>
+                </p:sp>
+                <p:sp>
+                  <p:nvSpPr>
+                    <p:cNvPr id="33" name="Freeform: Shape 32">
+                      <a:extLst>
+                        <a:ext uri="{FF2B5EF4-FFF2-40B4-BE49-F238E27FC236}">
+                          <a16:creationId xmlns:a16="http://schemas.microsoft.com/office/drawing/2014/main" id="{BF78C562-7933-4FAC-B623-EA8D4DCC20F7}"/>
+                        </a:ext>
+                      </a:extLst>
+                    </p:cNvPr>
+                    <p:cNvSpPr/>
+                    <p:nvPr/>
+                  </p:nvSpPr>
+                  <p:spPr>
+                    <a:xfrm flipV="1">
+                      <a:off x="4052491" y="1132697"/>
+                      <a:ext cx="592931" cy="316706"/>
+                    </a:xfrm>
+                    <a:custGeom>
+                      <a:avLst/>
+                      <a:gdLst>
+                        <a:gd name="connsiteX0" fmla="*/ 0 w 592931"/>
+                        <a:gd name="connsiteY0" fmla="*/ 0 h 316706"/>
+                        <a:gd name="connsiteX1" fmla="*/ 340519 w 592931"/>
+                        <a:gd name="connsiteY1" fmla="*/ 97631 h 316706"/>
+                        <a:gd name="connsiteX2" fmla="*/ 592931 w 592931"/>
+                        <a:gd name="connsiteY2" fmla="*/ 316706 h 316706"/>
+                      </a:gdLst>
+                      <a:ahLst/>
+                      <a:cxnLst>
+                        <a:cxn ang="0">
+                          <a:pos x="connsiteX0" y="connsiteY0"/>
+                        </a:cxn>
+                        <a:cxn ang="0">
+                          <a:pos x="connsiteX1" y="connsiteY1"/>
+                        </a:cxn>
+                        <a:cxn ang="0">
+                          <a:pos x="connsiteX2" y="connsiteY2"/>
+                        </a:cxn>
+                      </a:cxnLst>
+                      <a:rect l="l" t="t" r="r" b="b"/>
+                      <a:pathLst>
+                        <a:path w="592931" h="316706">
+                          <a:moveTo>
+                            <a:pt x="0" y="0"/>
+                          </a:moveTo>
+                          <a:cubicBezTo>
+                            <a:pt x="120848" y="22423"/>
+                            <a:pt x="241697" y="44847"/>
+                            <a:pt x="340519" y="97631"/>
+                          </a:cubicBezTo>
+                          <a:cubicBezTo>
+                            <a:pt x="439341" y="150415"/>
+                            <a:pt x="516136" y="233560"/>
+                            <a:pt x="592931" y="316706"/>
+                          </a:cubicBezTo>
+                        </a:path>
+                      </a:pathLst>
+                    </a:custGeom>
+                    <a:noFill/>
+                    <a:ln w="28575">
+                      <a:solidFill>
+                        <a:schemeClr val="tx1"/>
+                      </a:solidFill>
+                    </a:ln>
+                  </p:spPr>
+                  <p:style>
+                    <a:lnRef idx="2">
+                      <a:schemeClr val="accent1">
+                        <a:shade val="50000"/>
+                      </a:schemeClr>
+                    </a:lnRef>
+                    <a:fillRef idx="1">
+                      <a:schemeClr val="accent1"/>
+                    </a:fillRef>
+                    <a:effectRef idx="0">
+                      <a:schemeClr val="accent1"/>
+                    </a:effectRef>
+                    <a:fontRef idx="minor">
+                      <a:schemeClr val="lt1"/>
+                    </a:fontRef>
+                  </p:style>
+                  <p:txBody>
+                    <a:bodyPr rtlCol="0" anchor="ctr"/>
+                    <a:lstStyle/>
+                    <a:p>
+                      <a:pPr algn="ctr"/>
+                      <a:endParaRPr lang="en-US"/>
+                    </a:p>
+                  </p:txBody>
+                </p:sp>
+              </p:grpSp>
+              <p:cxnSp>
+                <p:nvCxnSpPr>
+                  <p:cNvPr id="29" name="Straight Connector 28">
+                    <a:extLst>
+                      <a:ext uri="{FF2B5EF4-FFF2-40B4-BE49-F238E27FC236}">
+                        <a16:creationId xmlns:a16="http://schemas.microsoft.com/office/drawing/2014/main" id="{3E4BFCE5-764F-4BDA-A47B-691B0721F95E}"/>
+                      </a:ext>
+                    </a:extLst>
+                  </p:cNvPr>
+                  <p:cNvCxnSpPr>
+                    <a:cxnSpLocks/>
+                  </p:cNvCxnSpPr>
+                  <p:nvPr/>
+                </p:nvCxnSpPr>
+                <p:spPr>
+                  <a:xfrm flipH="1" flipV="1">
+                    <a:off x="3797697" y="831056"/>
+                    <a:ext cx="259556" cy="2382"/>
+                  </a:xfrm>
+                  <a:prstGeom prst="line">
+                    <a:avLst/>
+                  </a:prstGeom>
+                  <a:ln w="28575">
+                    <a:solidFill>
+                      <a:schemeClr val="tx1"/>
+                    </a:solidFill>
+                  </a:ln>
+                </p:spPr>
+                <p:style>
+                  <a:lnRef idx="1">
+                    <a:schemeClr val="accent1"/>
+                  </a:lnRef>
+                  <a:fillRef idx="0">
+                    <a:schemeClr val="accent1"/>
+                  </a:fillRef>
+                  <a:effectRef idx="0">
+                    <a:schemeClr val="accent1"/>
+                  </a:effectRef>
+                  <a:fontRef idx="minor">
+                    <a:schemeClr val="tx1"/>
+                  </a:fontRef>
+                </p:style>
+              </p:cxnSp>
+              <p:cxnSp>
+                <p:nvCxnSpPr>
+                  <p:cNvPr id="30" name="Straight Connector 29">
+                    <a:extLst>
+                      <a:ext uri="{FF2B5EF4-FFF2-40B4-BE49-F238E27FC236}">
+                        <a16:creationId xmlns:a16="http://schemas.microsoft.com/office/drawing/2014/main" id="{A1EDD421-1988-4D63-9BA2-0271566C9295}"/>
+                      </a:ext>
+                    </a:extLst>
+                  </p:cNvPr>
+                  <p:cNvCxnSpPr>
+                    <a:cxnSpLocks/>
+                  </p:cNvCxnSpPr>
+                  <p:nvPr/>
+                </p:nvCxnSpPr>
+                <p:spPr>
+                  <a:xfrm flipH="1" flipV="1">
+                    <a:off x="3797697" y="1447800"/>
+                    <a:ext cx="259556" cy="2382"/>
+                  </a:xfrm>
+                  <a:prstGeom prst="line">
+                    <a:avLst/>
+                  </a:prstGeom>
+                  <a:ln w="28575">
+                    <a:solidFill>
+                      <a:schemeClr val="tx1"/>
+                    </a:solidFill>
+                  </a:ln>
+                </p:spPr>
+                <p:style>
+                  <a:lnRef idx="1">
+                    <a:schemeClr val="accent1"/>
+                  </a:lnRef>
+                  <a:fillRef idx="0">
+                    <a:schemeClr val="accent1"/>
+                  </a:fillRef>
+                  <a:effectRef idx="0">
+                    <a:schemeClr val="accent1"/>
+                  </a:effectRef>
+                  <a:fontRef idx="minor">
+                    <a:schemeClr val="tx1"/>
+                  </a:fontRef>
+                </p:style>
+              </p:cxnSp>
+            </p:grpSp>
+            <p:sp>
+              <p:nvSpPr>
+                <p:cNvPr id="27" name="Arc 26">
+                  <a:extLst>
+                    <a:ext uri="{FF2B5EF4-FFF2-40B4-BE49-F238E27FC236}">
+                      <a16:creationId xmlns:a16="http://schemas.microsoft.com/office/drawing/2014/main" id="{24615221-5EC7-438C-8EC0-FC6A74257FFE}"/>
+                    </a:ext>
+                  </a:extLst>
+                </p:cNvPr>
+                <p:cNvSpPr/>
+                <p:nvPr/>
+              </p:nvSpPr>
+              <p:spPr>
+                <a:xfrm rot="2700000">
+                  <a:off x="3465088" y="2250742"/>
+                  <a:ext cx="879774" cy="865921"/>
+                </a:xfrm>
+                <a:prstGeom prst="arc">
+                  <a:avLst>
+                    <a:gd name="adj1" fmla="val 16287124"/>
+                    <a:gd name="adj2" fmla="val 0"/>
+                  </a:avLst>
+                </a:prstGeom>
+                <a:ln w="28575">
+                  <a:solidFill>
+                    <a:schemeClr val="tx1"/>
+                  </a:solidFill>
+                </a:ln>
+              </p:spPr>
+              <p:style>
+                <a:lnRef idx="1">
+                  <a:schemeClr val="accent1"/>
+                </a:lnRef>
+                <a:fillRef idx="0">
+                  <a:schemeClr val="accent1"/>
+                </a:fillRef>
+                <a:effectRef idx="0">
+                  <a:schemeClr val="accent1"/>
+                </a:effectRef>
+                <a:fontRef idx="minor">
+                  <a:schemeClr val="tx1"/>
+                </a:fontRef>
+              </p:style>
+              <p:txBody>
+                <a:bodyPr rtlCol="0" anchor="ctr"/>
+                <a:lstStyle/>
+                <a:p>
+                  <a:pPr algn="ctr"/>
+                  <a:endParaRPr lang="en-US"/>
+                </a:p>
+              </p:txBody>
+            </p:sp>
+          </p:grpSp>
+          <p:cxnSp>
+            <p:nvCxnSpPr>
+              <p:cNvPr id="46" name="Straight Connector 45">
+                <a:extLst>
+                  <a:ext uri="{FF2B5EF4-FFF2-40B4-BE49-F238E27FC236}">
+                    <a16:creationId xmlns:a16="http://schemas.microsoft.com/office/drawing/2014/main" id="{C3ADB9B5-2519-418D-ACAA-16FE8164415E}"/>
+                  </a:ext>
+                </a:extLst>
+              </p:cNvPr>
+              <p:cNvCxnSpPr>
+                <a:cxnSpLocks/>
+              </p:cNvCxnSpPr>
+              <p:nvPr/>
+            </p:nvCxnSpPr>
+            <p:spPr>
+              <a:xfrm flipH="1" flipV="1">
+                <a:off x="3290806" y="1759787"/>
+                <a:ext cx="205162" cy="1480"/>
+              </a:xfrm>
+              <a:prstGeom prst="line">
+                <a:avLst/>
+              </a:prstGeom>
+              <a:ln w="28575">
+                <a:solidFill>
+                  <a:schemeClr val="tx1"/>
+                </a:solidFill>
+              </a:ln>
+            </p:spPr>
+            <p:style>
+              <a:lnRef idx="1">
+                <a:schemeClr val="accent1"/>
+              </a:lnRef>
+              <a:fillRef idx="0">
+                <a:schemeClr val="accent1"/>
+              </a:fillRef>
+              <a:effectRef idx="0">
+                <a:schemeClr val="accent1"/>
+              </a:effectRef>
+              <a:fontRef idx="minor">
+                <a:schemeClr val="tx1"/>
+              </a:fontRef>
+            </p:style>
+          </p:cxnSp>
+          <p:cxnSp>
+            <p:nvCxnSpPr>
+              <p:cNvPr id="54" name="Straight Connector 53">
+                <a:extLst>
+                  <a:ext uri="{FF2B5EF4-FFF2-40B4-BE49-F238E27FC236}">
+                    <a16:creationId xmlns:a16="http://schemas.microsoft.com/office/drawing/2014/main" id="{9DDF0CB3-4180-4CA7-89A7-9671D5EF12AF}"/>
+                  </a:ext>
+                </a:extLst>
+              </p:cNvPr>
+              <p:cNvCxnSpPr>
+                <a:cxnSpLocks/>
+              </p:cNvCxnSpPr>
+              <p:nvPr/>
+            </p:nvCxnSpPr>
+            <p:spPr>
+              <a:xfrm flipH="1" flipV="1">
+                <a:off x="3279376" y="2742371"/>
+                <a:ext cx="205162" cy="1480"/>
+              </a:xfrm>
+              <a:prstGeom prst="line">
+                <a:avLst/>
+              </a:prstGeom>
+              <a:ln w="28575">
+                <a:solidFill>
+                  <a:schemeClr val="tx1"/>
+                </a:solidFill>
+              </a:ln>
+            </p:spPr>
+            <p:style>
+              <a:lnRef idx="1">
+                <a:schemeClr val="accent1"/>
+              </a:lnRef>
+              <a:fillRef idx="0">
+                <a:schemeClr val="accent1"/>
+              </a:fillRef>
+              <a:effectRef idx="0">
+                <a:schemeClr val="accent1"/>
+              </a:effectRef>
+              <a:fontRef idx="minor">
+                <a:schemeClr val="tx1"/>
+              </a:fontRef>
+            </p:style>
+          </p:cxnSp>
+        </p:grpSp>
+      </p:grpSp>
     </p:spTree>
     <p:extLst>
       <p:ext uri="{BB962C8B-B14F-4D97-AF65-F5344CB8AC3E}">

</xml_diff>